<commit_message>
Dodat poster i ispravljene prezentacije
</commit_message>
<xml_diff>
--- a/rid_2022_seminarski/mi18130_Bogdan_Markovic/predavanje_2/BogdanMarkovicPrezentacija.pptx
+++ b/rid_2022_seminarski/mi18130_Bogdan_Markovic/predavanje_2/BogdanMarkovicPrezentacija.pptx
@@ -19938,7 +19938,7 @@
         </p:blipFill>
         <p:spPr>
           <a:xfrm>
-            <a:off x="4243388" y="3252400"/>
+            <a:off x="4392713" y="3298025"/>
             <a:ext cx="2886075" cy="1581150"/>
           </a:xfrm>
           <a:prstGeom prst="rect">
@@ -19965,7 +19965,7 @@
         </p:blipFill>
         <p:spPr>
           <a:xfrm>
-            <a:off x="6348925" y="660363"/>
+            <a:off x="4693850" y="270463"/>
             <a:ext cx="2457450" cy="1857375"/>
           </a:xfrm>
           <a:prstGeom prst="rect">
@@ -22096,7 +22096,7 @@
         </p:blipFill>
         <p:spPr>
           <a:xfrm>
-            <a:off x="5429813" y="2493975"/>
+            <a:off x="5762338" y="3180050"/>
             <a:ext cx="2886075" cy="1581150"/>
           </a:xfrm>
           <a:prstGeom prst="rect">
@@ -22648,7 +22648,7 @@
         </p:blipFill>
         <p:spPr>
           <a:xfrm>
-            <a:off x="6019788" y="292213"/>
+            <a:off x="5993213" y="287788"/>
             <a:ext cx="2619375" cy="1743075"/>
           </a:xfrm>
           <a:prstGeom prst="rect">

</xml_diff>